<commit_message>
Solutions for lesson 1.
</commit_message>
<xml_diff>
--- a/lessons/lesson_3/lecture3.pptx
+++ b/lessons/lesson_3/lecture3.pptx
@@ -5,25 +5,24 @@
     <p:sldMasterId id="2147483648" r:id="rId1"/>
   </p:sldMasterIdLst>
   <p:sldIdLst>
-    <p:sldId id="256" r:id="rId2"/>
-    <p:sldId id="267" r:id="rId3"/>
-    <p:sldId id="269" r:id="rId4"/>
-    <p:sldId id="268" r:id="rId5"/>
-    <p:sldId id="270" r:id="rId6"/>
-    <p:sldId id="271" r:id="rId7"/>
-    <p:sldId id="272" r:id="rId8"/>
-    <p:sldId id="273" r:id="rId9"/>
-    <p:sldId id="259" r:id="rId10"/>
-    <p:sldId id="257" r:id="rId11"/>
-    <p:sldId id="258" r:id="rId12"/>
-    <p:sldId id="260" r:id="rId13"/>
-    <p:sldId id="261" r:id="rId14"/>
-    <p:sldId id="262" r:id="rId15"/>
-    <p:sldId id="263" r:id="rId16"/>
-    <p:sldId id="264" r:id="rId17"/>
-    <p:sldId id="265" r:id="rId18"/>
-    <p:sldId id="266" r:id="rId19"/>
-    <p:sldId id="274" r:id="rId20"/>
+    <p:sldId id="267" r:id="rId2"/>
+    <p:sldId id="269" r:id="rId3"/>
+    <p:sldId id="268" r:id="rId4"/>
+    <p:sldId id="270" r:id="rId5"/>
+    <p:sldId id="271" r:id="rId6"/>
+    <p:sldId id="272" r:id="rId7"/>
+    <p:sldId id="273" r:id="rId8"/>
+    <p:sldId id="259" r:id="rId9"/>
+    <p:sldId id="257" r:id="rId10"/>
+    <p:sldId id="258" r:id="rId11"/>
+    <p:sldId id="260" r:id="rId12"/>
+    <p:sldId id="261" r:id="rId13"/>
+    <p:sldId id="262" r:id="rId14"/>
+    <p:sldId id="263" r:id="rId15"/>
+    <p:sldId id="264" r:id="rId16"/>
+    <p:sldId id="265" r:id="rId17"/>
+    <p:sldId id="266" r:id="rId18"/>
+    <p:sldId id="274" r:id="rId19"/>
   </p:sldIdLst>
   <p:sldSz cx="12192000" cy="6858000"/>
   <p:notesSz cx="6858000" cy="9144000"/>
@@ -122,6 +121,11 @@
       </a:defRPr>
     </a:lvl9pPr>
   </p:defaultTextStyle>
+  <p:extLst>
+    <p:ext uri="{EFAFB233-063F-42B5-8137-9DF3F51BA10A}">
+      <p15:sldGuideLst xmlns:p15="http://schemas.microsoft.com/office/powerpoint/2012/main"/>
+    </p:ext>
+  </p:extLst>
 </p:presentation>
 </file>
 
@@ -274,7 +278,7 @@
           <a:p>
             <a:fld id="{B92A3AC5-2351-EB4B-9B00-5519DF162E9D}" type="datetimeFigureOut">
               <a:rPr lang="en-DK" smtClean="0"/>
-              <a:t>21/01/2025</a:t>
+              <a:t>22/01/2025</a:t>
             </a:fld>
             <a:endParaRPr lang="en-DK"/>
           </a:p>
@@ -474,7 +478,7 @@
           <a:p>
             <a:fld id="{B92A3AC5-2351-EB4B-9B00-5519DF162E9D}" type="datetimeFigureOut">
               <a:rPr lang="en-DK" smtClean="0"/>
-              <a:t>21/01/2025</a:t>
+              <a:t>22/01/2025</a:t>
             </a:fld>
             <a:endParaRPr lang="en-DK"/>
           </a:p>
@@ -684,7 +688,7 @@
           <a:p>
             <a:fld id="{B92A3AC5-2351-EB4B-9B00-5519DF162E9D}" type="datetimeFigureOut">
               <a:rPr lang="en-DK" smtClean="0"/>
-              <a:t>21/01/2025</a:t>
+              <a:t>22/01/2025</a:t>
             </a:fld>
             <a:endParaRPr lang="en-DK"/>
           </a:p>
@@ -884,7 +888,7 @@
           <a:p>
             <a:fld id="{B92A3AC5-2351-EB4B-9B00-5519DF162E9D}" type="datetimeFigureOut">
               <a:rPr lang="en-DK" smtClean="0"/>
-              <a:t>21/01/2025</a:t>
+              <a:t>22/01/2025</a:t>
             </a:fld>
             <a:endParaRPr lang="en-DK"/>
           </a:p>
@@ -1160,7 +1164,7 @@
           <a:p>
             <a:fld id="{B92A3AC5-2351-EB4B-9B00-5519DF162E9D}" type="datetimeFigureOut">
               <a:rPr lang="en-DK" smtClean="0"/>
-              <a:t>21/01/2025</a:t>
+              <a:t>22/01/2025</a:t>
             </a:fld>
             <a:endParaRPr lang="en-DK"/>
           </a:p>
@@ -1428,7 +1432,7 @@
           <a:p>
             <a:fld id="{B92A3AC5-2351-EB4B-9B00-5519DF162E9D}" type="datetimeFigureOut">
               <a:rPr lang="en-DK" smtClean="0"/>
-              <a:t>21/01/2025</a:t>
+              <a:t>22/01/2025</a:t>
             </a:fld>
             <a:endParaRPr lang="en-DK"/>
           </a:p>
@@ -1843,7 +1847,7 @@
           <a:p>
             <a:fld id="{B92A3AC5-2351-EB4B-9B00-5519DF162E9D}" type="datetimeFigureOut">
               <a:rPr lang="en-DK" smtClean="0"/>
-              <a:t>21/01/2025</a:t>
+              <a:t>22/01/2025</a:t>
             </a:fld>
             <a:endParaRPr lang="en-DK"/>
           </a:p>
@@ -1985,7 +1989,7 @@
           <a:p>
             <a:fld id="{B92A3AC5-2351-EB4B-9B00-5519DF162E9D}" type="datetimeFigureOut">
               <a:rPr lang="en-DK" smtClean="0"/>
-              <a:t>21/01/2025</a:t>
+              <a:t>22/01/2025</a:t>
             </a:fld>
             <a:endParaRPr lang="en-DK"/>
           </a:p>
@@ -2098,7 +2102,7 @@
           <a:p>
             <a:fld id="{B92A3AC5-2351-EB4B-9B00-5519DF162E9D}" type="datetimeFigureOut">
               <a:rPr lang="en-DK" smtClean="0"/>
-              <a:t>21/01/2025</a:t>
+              <a:t>22/01/2025</a:t>
             </a:fld>
             <a:endParaRPr lang="en-DK"/>
           </a:p>
@@ -2411,7 +2415,7 @@
           <a:p>
             <a:fld id="{B92A3AC5-2351-EB4B-9B00-5519DF162E9D}" type="datetimeFigureOut">
               <a:rPr lang="en-DK" smtClean="0"/>
-              <a:t>21/01/2025</a:t>
+              <a:t>22/01/2025</a:t>
             </a:fld>
             <a:endParaRPr lang="en-DK"/>
           </a:p>
@@ -2700,7 +2704,7 @@
           <a:p>
             <a:fld id="{B92A3AC5-2351-EB4B-9B00-5519DF162E9D}" type="datetimeFigureOut">
               <a:rPr lang="en-DK" smtClean="0"/>
-              <a:t>21/01/2025</a:t>
+              <a:t>22/01/2025</a:t>
             </a:fld>
             <a:endParaRPr lang="en-DK"/>
           </a:p>
@@ -2943,7 +2947,7 @@
           <a:p>
             <a:fld id="{B92A3AC5-2351-EB4B-9B00-5519DF162E9D}" type="datetimeFigureOut">
               <a:rPr lang="en-DK" smtClean="0"/>
-              <a:t>21/01/2025</a:t>
+              <a:t>22/01/2025</a:t>
             </a:fld>
             <a:endParaRPr lang="en-DK"/>
           </a:p>
@@ -3365,65 +3369,7 @@
           <p:cNvPr id="2" name="Title 1">
             <a:extLst>
               <a:ext uri="{FF2B5EF4-FFF2-40B4-BE49-F238E27FC236}">
-                <a16:creationId xmlns:a16="http://schemas.microsoft.com/office/drawing/2014/main" id="{17AEB823-B2B9-A283-3C9E-78B47C0997F3}"/>
-              </a:ext>
-            </a:extLst>
-          </p:cNvPr>
-          <p:cNvSpPr>
-            <a:spLocks noGrp="1"/>
-          </p:cNvSpPr>
-          <p:nvPr>
-            <p:ph type="ctrTitle"/>
-          </p:nvPr>
-        </p:nvSpPr>
-        <p:spPr/>
-        <p:txBody>
-          <a:bodyPr/>
-          <a:lstStyle/>
-          <a:p>
-            <a:r>
-              <a:rPr lang="en-DK" dirty="0"/>
-              <a:t>Potentials</a:t>
-            </a:r>
-          </a:p>
-        </p:txBody>
-      </p:sp>
-    </p:spTree>
-    <p:extLst>
-      <p:ext uri="{BB962C8B-B14F-4D97-AF65-F5344CB8AC3E}">
-        <p14:creationId xmlns:p14="http://schemas.microsoft.com/office/powerpoint/2010/main" val="1739215066"/>
-      </p:ext>
-    </p:extLst>
-  </p:cSld>
-  <p:clrMapOvr>
-    <a:masterClrMapping/>
-  </p:clrMapOvr>
-</p:sld>
-</file>
-
-<file path=ppt/slides/slide10.xml><?xml version="1.0" encoding="utf-8"?>
-<p:sld xmlns:a="http://schemas.openxmlformats.org/drawingml/2006/main" xmlns:r="http://schemas.openxmlformats.org/officeDocument/2006/relationships" xmlns:p="http://schemas.openxmlformats.org/presentationml/2006/main">
-  <p:cSld>
-    <p:spTree>
-      <p:nvGrpSpPr>
-        <p:cNvPr id="1" name=""/>
-        <p:cNvGrpSpPr/>
-        <p:nvPr/>
-      </p:nvGrpSpPr>
-      <p:grpSpPr>
-        <a:xfrm>
-          <a:off x="0" y="0"/>
-          <a:ext cx="0" cy="0"/>
-          <a:chOff x="0" y="0"/>
-          <a:chExt cx="0" cy="0"/>
-        </a:xfrm>
-      </p:grpSpPr>
-      <p:sp>
-        <p:nvSpPr>
-          <p:cNvPr id="2" name="Title 1">
-            <a:extLst>
-              <a:ext uri="{FF2B5EF4-FFF2-40B4-BE49-F238E27FC236}">
-                <a16:creationId xmlns:a16="http://schemas.microsoft.com/office/drawing/2014/main" id="{B82B09A3-D92F-D949-C118-7C1BABF0174C}"/>
+                <a16:creationId xmlns:a16="http://schemas.microsoft.com/office/drawing/2014/main" id="{88AFB721-957D-BEE9-9587-64D7185C6BE4}"/>
               </a:ext>
             </a:extLst>
           </p:cNvPr>
@@ -3441,17 +3387,292 @@
           <a:p>
             <a:r>
               <a:rPr lang="en-DK" dirty="0"/>
-              <a:t>Atoms</a:t>
+              <a:t>Recap: Derivatives using torch</a:t>
             </a:r>
           </a:p>
         </p:txBody>
       </p:sp>
+      <mc:AlternateContent xmlns:mc="http://schemas.openxmlformats.org/markup-compatibility/2006" xmlns:a14="http://schemas.microsoft.com/office/drawing/2010/main">
+        <mc:Choice Requires="a14">
+          <p:sp>
+            <p:nvSpPr>
+              <p:cNvPr id="4" name="TextBox 3">
+                <a:extLst>
+                  <a:ext uri="{FF2B5EF4-FFF2-40B4-BE49-F238E27FC236}">
+                    <a16:creationId xmlns:a16="http://schemas.microsoft.com/office/drawing/2014/main" id="{1AD5FA00-C094-226A-D142-D5B12BFA17A3}"/>
+                  </a:ext>
+                </a:extLst>
+              </p:cNvPr>
+              <p:cNvSpPr txBox="1"/>
+              <p:nvPr/>
+            </p:nvSpPr>
+            <p:spPr>
+              <a:xfrm>
+                <a:off x="1699889" y="3046522"/>
+                <a:ext cx="1857303" cy="492443"/>
+              </a:xfrm>
+              <a:prstGeom prst="rect">
+                <a:avLst/>
+              </a:prstGeom>
+              <a:noFill/>
+            </p:spPr>
+            <p:txBody>
+              <a:bodyPr wrap="none" lIns="0" tIns="0" rIns="0" bIns="0" rtlCol="0">
+                <a:spAutoFit/>
+              </a:bodyPr>
+              <a:lstStyle/>
+              <a:p>
+                <a:pPr/>
+                <a14:m>
+                  <m:oMathPara xmlns:m="http://schemas.openxmlformats.org/officeDocument/2006/math">
+                    <m:oMathParaPr>
+                      <m:jc m:val="centerGroup"/>
+                    </m:oMathParaPr>
+                    <m:oMath xmlns:m="http://schemas.openxmlformats.org/officeDocument/2006/math">
+                      <m:r>
+                        <a:rPr lang="da-DK" sz="3200" b="0" i="1" smtClean="0">
+                          <a:latin typeface="Cambria Math" panose="02040503050406030204" pitchFamily="18" charset="0"/>
+                        </a:rPr>
+                        <m:t>𝑓</m:t>
+                      </m:r>
+                      <m:d>
+                        <m:dPr>
+                          <m:ctrlPr>
+                            <a:rPr lang="da-DK" sz="3200" b="0" i="1" smtClean="0">
+                              <a:latin typeface="Cambria Math" panose="02040503050406030204" pitchFamily="18" charset="0"/>
+                            </a:rPr>
+                          </m:ctrlPr>
+                        </m:dPr>
+                        <m:e>
+                          <m:r>
+                            <a:rPr lang="da-DK" sz="3200" b="0" i="1" smtClean="0">
+                              <a:latin typeface="Cambria Math" panose="02040503050406030204" pitchFamily="18" charset="0"/>
+                            </a:rPr>
+                            <m:t>𝑥</m:t>
+                          </m:r>
+                        </m:e>
+                      </m:d>
+                      <m:r>
+                        <a:rPr lang="da-DK" sz="3200" b="0" i="1" smtClean="0">
+                          <a:latin typeface="Cambria Math" panose="02040503050406030204" pitchFamily="18" charset="0"/>
+                        </a:rPr>
+                        <m:t>=</m:t>
+                      </m:r>
+                      <m:sSup>
+                        <m:sSupPr>
+                          <m:ctrlPr>
+                            <a:rPr lang="da-DK" sz="3200" b="0" i="1" smtClean="0">
+                              <a:latin typeface="Cambria Math" panose="02040503050406030204" pitchFamily="18" charset="0"/>
+                            </a:rPr>
+                          </m:ctrlPr>
+                        </m:sSupPr>
+                        <m:e>
+                          <m:r>
+                            <a:rPr lang="da-DK" sz="3200" b="0" i="1" smtClean="0">
+                              <a:latin typeface="Cambria Math" panose="02040503050406030204" pitchFamily="18" charset="0"/>
+                            </a:rPr>
+                            <m:t>𝑥</m:t>
+                          </m:r>
+                        </m:e>
+                        <m:sup>
+                          <m:r>
+                            <a:rPr lang="da-DK" sz="3200" b="0" i="1" smtClean="0">
+                              <a:latin typeface="Cambria Math" panose="02040503050406030204" pitchFamily="18" charset="0"/>
+                            </a:rPr>
+                            <m:t>2</m:t>
+                          </m:r>
+                        </m:sup>
+                      </m:sSup>
+                    </m:oMath>
+                  </m:oMathPara>
+                </a14:m>
+                <a:endParaRPr lang="en-DK" sz="3200" dirty="0"/>
+              </a:p>
+            </p:txBody>
+          </p:sp>
+        </mc:Choice>
+        <mc:Fallback xmlns="">
+          <p:sp>
+            <p:nvSpPr>
+              <p:cNvPr id="4" name="TextBox 3">
+                <a:extLst>
+                  <a:ext uri="{FF2B5EF4-FFF2-40B4-BE49-F238E27FC236}">
+                    <a16:creationId xmlns:a16="http://schemas.microsoft.com/office/drawing/2014/main" id="{1AD5FA00-C094-226A-D142-D5B12BFA17A3}"/>
+                  </a:ext>
+                </a:extLst>
+              </p:cNvPr>
+              <p:cNvSpPr txBox="1">
+                <a:spLocks noRot="1" noChangeAspect="1" noMove="1" noResize="1" noEditPoints="1" noAdjustHandles="1" noChangeArrowheads="1" noChangeShapeType="1" noTextEdit="1"/>
+              </p:cNvSpPr>
+              <p:nvPr/>
+            </p:nvSpPr>
+            <p:spPr>
+              <a:xfrm>
+                <a:off x="1699889" y="3046522"/>
+                <a:ext cx="1857303" cy="492443"/>
+              </a:xfrm>
+              <a:prstGeom prst="rect">
+                <a:avLst/>
+              </a:prstGeom>
+              <a:blipFill>
+                <a:blip r:embed="rId2"/>
+                <a:stretch>
+                  <a:fillRect l="-7432" t="-2564" r="-1351" b="-33333"/>
+                </a:stretch>
+              </a:blipFill>
+            </p:spPr>
+            <p:txBody>
+              <a:bodyPr/>
+              <a:lstStyle/>
+              <a:p>
+                <a:r>
+                  <a:rPr lang="en-DK">
+                    <a:noFill/>
+                  </a:rPr>
+                  <a:t> </a:t>
+                </a:r>
+              </a:p>
+            </p:txBody>
+          </p:sp>
+        </mc:Fallback>
+      </mc:AlternateContent>
+      <mc:AlternateContent xmlns:mc="http://schemas.openxmlformats.org/markup-compatibility/2006" xmlns:a14="http://schemas.microsoft.com/office/drawing/2010/main">
+        <mc:Choice Requires="a14">
+          <p:sp>
+            <p:nvSpPr>
+              <p:cNvPr id="5" name="TextBox 4">
+                <a:extLst>
+                  <a:ext uri="{FF2B5EF4-FFF2-40B4-BE49-F238E27FC236}">
+                    <a16:creationId xmlns:a16="http://schemas.microsoft.com/office/drawing/2014/main" id="{27C2E11E-4B04-09DE-986A-9C3D894FEA23}"/>
+                  </a:ext>
+                </a:extLst>
+              </p:cNvPr>
+              <p:cNvSpPr txBox="1"/>
+              <p:nvPr/>
+            </p:nvSpPr>
+            <p:spPr>
+              <a:xfrm>
+                <a:off x="1639296" y="3850957"/>
+                <a:ext cx="1978490" cy="492443"/>
+              </a:xfrm>
+              <a:prstGeom prst="rect">
+                <a:avLst/>
+              </a:prstGeom>
+              <a:noFill/>
+            </p:spPr>
+            <p:txBody>
+              <a:bodyPr wrap="none" lIns="0" tIns="0" rIns="0" bIns="0" rtlCol="0">
+                <a:spAutoFit/>
+              </a:bodyPr>
+              <a:lstStyle/>
+              <a:p>
+                <a:pPr/>
+                <a14:m>
+                  <m:oMathPara xmlns:m="http://schemas.openxmlformats.org/officeDocument/2006/math">
+                    <m:oMathParaPr>
+                      <m:jc m:val="centerGroup"/>
+                    </m:oMathParaPr>
+                    <m:oMath xmlns:m="http://schemas.openxmlformats.org/officeDocument/2006/math">
+                      <m:r>
+                        <a:rPr lang="da-DK" sz="3200" b="0" i="1" smtClean="0">
+                          <a:latin typeface="Cambria Math" panose="02040503050406030204" pitchFamily="18" charset="0"/>
+                        </a:rPr>
+                        <m:t>𝑓</m:t>
+                      </m:r>
+                      <m:r>
+                        <a:rPr lang="da-DK" sz="3200" b="0" i="1" smtClean="0">
+                          <a:latin typeface="Cambria Math" panose="02040503050406030204" pitchFamily="18" charset="0"/>
+                        </a:rPr>
+                        <m:t>′</m:t>
+                      </m:r>
+                      <m:d>
+                        <m:dPr>
+                          <m:ctrlPr>
+                            <a:rPr lang="da-DK" sz="3200" b="0" i="1" smtClean="0">
+                              <a:latin typeface="Cambria Math" panose="02040503050406030204" pitchFamily="18" charset="0"/>
+                            </a:rPr>
+                          </m:ctrlPr>
+                        </m:dPr>
+                        <m:e>
+                          <m:r>
+                            <a:rPr lang="da-DK" sz="3200" b="0" i="1" smtClean="0">
+                              <a:latin typeface="Cambria Math" panose="02040503050406030204" pitchFamily="18" charset="0"/>
+                            </a:rPr>
+                            <m:t>𝑥</m:t>
+                          </m:r>
+                        </m:e>
+                      </m:d>
+                      <m:r>
+                        <a:rPr lang="da-DK" sz="3200" b="0" i="1" smtClean="0">
+                          <a:latin typeface="Cambria Math" panose="02040503050406030204" pitchFamily="18" charset="0"/>
+                        </a:rPr>
+                        <m:t>=2</m:t>
+                      </m:r>
+                      <m:r>
+                        <a:rPr lang="da-DK" sz="3200" b="0" i="1" smtClean="0">
+                          <a:latin typeface="Cambria Math" panose="02040503050406030204" pitchFamily="18" charset="0"/>
+                        </a:rPr>
+                        <m:t>𝑥</m:t>
+                      </m:r>
+                    </m:oMath>
+                  </m:oMathPara>
+                </a14:m>
+                <a:endParaRPr lang="en-DK" sz="3200" dirty="0"/>
+              </a:p>
+            </p:txBody>
+          </p:sp>
+        </mc:Choice>
+        <mc:Fallback xmlns="">
+          <p:sp>
+            <p:nvSpPr>
+              <p:cNvPr id="5" name="TextBox 4">
+                <a:extLst>
+                  <a:ext uri="{FF2B5EF4-FFF2-40B4-BE49-F238E27FC236}">
+                    <a16:creationId xmlns:a16="http://schemas.microsoft.com/office/drawing/2014/main" id="{27C2E11E-4B04-09DE-986A-9C3D894FEA23}"/>
+                  </a:ext>
+                </a:extLst>
+              </p:cNvPr>
+              <p:cNvSpPr txBox="1">
+                <a:spLocks noRot="1" noChangeAspect="1" noMove="1" noResize="1" noEditPoints="1" noAdjustHandles="1" noChangeArrowheads="1" noChangeShapeType="1" noTextEdit="1"/>
+              </p:cNvSpPr>
+              <p:nvPr/>
+            </p:nvSpPr>
+            <p:spPr>
+              <a:xfrm>
+                <a:off x="1639296" y="3850957"/>
+                <a:ext cx="1978490" cy="492443"/>
+              </a:xfrm>
+              <a:prstGeom prst="rect">
+                <a:avLst/>
+              </a:prstGeom>
+              <a:blipFill>
+                <a:blip r:embed="rId3"/>
+                <a:stretch>
+                  <a:fillRect l="-8333" t="-7500" r="-3846" b="-35000"/>
+                </a:stretch>
+              </a:blipFill>
+            </p:spPr>
+            <p:txBody>
+              <a:bodyPr/>
+              <a:lstStyle/>
+              <a:p>
+                <a:r>
+                  <a:rPr lang="en-DK">
+                    <a:noFill/>
+                  </a:rPr>
+                  <a:t> </a:t>
+                </a:r>
+              </a:p>
+            </p:txBody>
+          </p:sp>
+        </mc:Fallback>
+      </mc:AlternateContent>
       <p:pic>
         <p:nvPicPr>
-          <p:cNvPr id="6" name="Picture 5">
-            <a:extLst>
-              <a:ext uri="{FF2B5EF4-FFF2-40B4-BE49-F238E27FC236}">
-                <a16:creationId xmlns:a16="http://schemas.microsoft.com/office/drawing/2014/main" id="{2841D1F3-6D21-DF55-D686-AEDEE6A17CE1}"/>
+          <p:cNvPr id="6" name="Picture 5" descr="A computer screen shot of a program&#10;&#10;AI-generated content may be incorrect.">
+            <a:extLst>
+              <a:ext uri="{FF2B5EF4-FFF2-40B4-BE49-F238E27FC236}">
+                <a16:creationId xmlns:a16="http://schemas.microsoft.com/office/drawing/2014/main" id="{3670246A-3238-048F-F0CA-292C9B7A0A49}"/>
               </a:ext>
             </a:extLst>
           </p:cNvPr>
@@ -3461,102 +3682,35 @@
           <p:nvPr/>
         </p:nvPicPr>
         <p:blipFill>
-          <a:blip r:embed="rId2"/>
+          <a:blip r:embed="rId4"/>
           <a:stretch>
             <a:fillRect/>
           </a:stretch>
         </p:blipFill>
         <p:spPr>
           <a:xfrm>
-            <a:off x="739237" y="2816192"/>
-            <a:ext cx="10614563" cy="1110525"/>
+            <a:off x="4645135" y="2122657"/>
+            <a:ext cx="6057494" cy="3456600"/>
           </a:xfrm>
           <a:prstGeom prst="rect">
             <a:avLst/>
           </a:prstGeom>
+          <a:ln>
+            <a:noFill/>
+          </a:ln>
+          <a:effectLst>
+            <a:outerShdw blurRad="292100" dist="139700" dir="2700000" algn="tl" rotWithShape="0">
+              <a:srgbClr val="333333">
+                <a:alpha val="65000"/>
+              </a:srgbClr>
+            </a:outerShdw>
+          </a:effectLst>
         </p:spPr>
       </p:pic>
-      <p:sp>
-        <p:nvSpPr>
-          <p:cNvPr id="7" name="TextBox 6">
-            <a:extLst>
-              <a:ext uri="{FF2B5EF4-FFF2-40B4-BE49-F238E27FC236}">
-                <a16:creationId xmlns:a16="http://schemas.microsoft.com/office/drawing/2014/main" id="{898CFF2D-BA6B-8134-2C5E-C09B4A3D877F}"/>
-              </a:ext>
-            </a:extLst>
-          </p:cNvPr>
-          <p:cNvSpPr txBox="1"/>
-          <p:nvPr/>
-        </p:nvSpPr>
-        <p:spPr>
-          <a:xfrm>
-            <a:off x="1206504" y="2436350"/>
-            <a:ext cx="9680027" cy="369332"/>
-          </a:xfrm>
-          <a:prstGeom prst="rect">
-            <a:avLst/>
-          </a:prstGeom>
-          <a:noFill/>
-        </p:spPr>
-        <p:txBody>
-          <a:bodyPr wrap="square" rtlCol="0">
-            <a:spAutoFit/>
-          </a:bodyPr>
-          <a:lstStyle/>
-          <a:p>
-            <a:r>
-              <a:rPr lang="en-GB" dirty="0"/>
-              <a:t>The many-electron time-independent Schrödinger equation is what governs at the atomic scale </a:t>
-            </a:r>
-            <a:endParaRPr lang="en-DK" dirty="0"/>
-          </a:p>
-        </p:txBody>
-      </p:sp>
-      <p:sp>
-        <p:nvSpPr>
-          <p:cNvPr id="8" name="TextBox 7">
-            <a:extLst>
-              <a:ext uri="{FF2B5EF4-FFF2-40B4-BE49-F238E27FC236}">
-                <a16:creationId xmlns:a16="http://schemas.microsoft.com/office/drawing/2014/main" id="{E6DE4961-3E1B-1453-0C86-6A6F161C6C75}"/>
-              </a:ext>
-            </a:extLst>
-          </p:cNvPr>
-          <p:cNvSpPr txBox="1"/>
-          <p:nvPr/>
-        </p:nvSpPr>
-        <p:spPr>
-          <a:xfrm>
-            <a:off x="1206503" y="4060199"/>
-            <a:ext cx="9680027" cy="646331"/>
-          </a:xfrm>
-          <a:prstGeom prst="rect">
-            <a:avLst/>
-          </a:prstGeom>
-          <a:noFill/>
-        </p:spPr>
-        <p:txBody>
-          <a:bodyPr wrap="square" rtlCol="0">
-            <a:spAutoFit/>
-          </a:bodyPr>
-          <a:lstStyle/>
-          <a:p>
-            <a:r>
-              <a:rPr lang="en-DK" dirty="0"/>
-              <a:t>Generally unsolvable – so that’s a nice starting point. However, plenty of approximations exists, </a:t>
-            </a:r>
-          </a:p>
-          <a:p>
-            <a:r>
-              <a:rPr lang="en-DK" dirty="0"/>
-              <a:t>specifically computational approximations. </a:t>
-            </a:r>
-          </a:p>
-        </p:txBody>
-      </p:sp>
     </p:spTree>
     <p:extLst>
       <p:ext uri="{BB962C8B-B14F-4D97-AF65-F5344CB8AC3E}">
-        <p14:creationId xmlns:p14="http://schemas.microsoft.com/office/powerpoint/2010/main" val="682773001"/>
+        <p14:creationId xmlns:p14="http://schemas.microsoft.com/office/powerpoint/2010/main" val="1071640773"/>
       </p:ext>
     </p:extLst>
   </p:cSld>
@@ -3566,7 +3720,7 @@
 </p:sld>
 </file>
 
-<file path=ppt/slides/slide11.xml><?xml version="1.0" encoding="utf-8"?>
+<file path=ppt/slides/slide10.xml><?xml version="1.0" encoding="utf-8"?>
 <p:sld xmlns:a="http://schemas.openxmlformats.org/drawingml/2006/main" xmlns:r="http://schemas.openxmlformats.org/officeDocument/2006/relationships" xmlns:p="http://schemas.openxmlformats.org/presentationml/2006/main">
   <p:cSld>
     <p:spTree>
@@ -3683,8 +3837,8 @@
           </a:fontRef>
         </p:style>
       </p:cxnSp>
-      <mc:AlternateContent xmlns:mc="http://schemas.openxmlformats.org/markup-compatibility/2006">
-        <mc:Choice xmlns:a14="http://schemas.microsoft.com/office/drawing/2010/main" Requires="a14">
+      <mc:AlternateContent xmlns:mc="http://schemas.openxmlformats.org/markup-compatibility/2006" xmlns:a14="http://schemas.microsoft.com/office/drawing/2010/main">
+        <mc:Choice Requires="a14">
           <p:sp>
             <p:nvSpPr>
               <p:cNvPr id="9" name="TextBox 8">
@@ -3732,7 +3886,7 @@
             </p:txBody>
           </p:sp>
         </mc:Choice>
-        <mc:Fallback>
+        <mc:Fallback xmlns="">
           <p:sp>
             <p:nvSpPr>
               <p:cNvPr id="9" name="TextBox 8">
@@ -3821,8 +3975,8 @@
           </a:fontRef>
         </p:style>
       </p:cxnSp>
-      <mc:AlternateContent xmlns:mc="http://schemas.openxmlformats.org/markup-compatibility/2006">
-        <mc:Choice xmlns:a14="http://schemas.microsoft.com/office/drawing/2010/main" Requires="a14">
+      <mc:AlternateContent xmlns:mc="http://schemas.openxmlformats.org/markup-compatibility/2006" xmlns:a14="http://schemas.microsoft.com/office/drawing/2010/main">
+        <mc:Choice Requires="a14">
           <p:sp>
             <p:nvSpPr>
               <p:cNvPr id="11" name="TextBox 10">
@@ -3923,7 +4077,7 @@
             </p:txBody>
           </p:sp>
         </mc:Choice>
-        <mc:Fallback>
+        <mc:Fallback xmlns="">
           <p:sp>
             <p:nvSpPr>
               <p:cNvPr id="11" name="TextBox 10">
@@ -4139,7 +4293,7 @@
 </p:sld>
 </file>
 
-<file path=ppt/slides/slide12.xml><?xml version="1.0" encoding="utf-8"?>
+<file path=ppt/slides/slide11.xml><?xml version="1.0" encoding="utf-8"?>
 <p:sld xmlns:a="http://schemas.openxmlformats.org/drawingml/2006/main" xmlns:r="http://schemas.openxmlformats.org/officeDocument/2006/relationships" xmlns:p="http://schemas.openxmlformats.org/presentationml/2006/main">
   <p:cSld>
     <p:spTree>
@@ -5257,7 +5411,7 @@
 </p:sld>
 </file>
 
-<file path=ppt/slides/slide13.xml><?xml version="1.0" encoding="utf-8"?>
+<file path=ppt/slides/slide12.xml><?xml version="1.0" encoding="utf-8"?>
 <p:sld xmlns:a="http://schemas.openxmlformats.org/drawingml/2006/main" xmlns:r="http://schemas.openxmlformats.org/officeDocument/2006/relationships" xmlns:p="http://schemas.openxmlformats.org/presentationml/2006/main">
   <p:cSld>
     <p:spTree>
@@ -8275,7 +8429,7 @@
 </p:sld>
 </file>
 
-<file path=ppt/slides/slide14.xml><?xml version="1.0" encoding="utf-8"?>
+<file path=ppt/slides/slide13.xml><?xml version="1.0" encoding="utf-8"?>
 <p:sld xmlns:a="http://schemas.openxmlformats.org/drawingml/2006/main" xmlns:r="http://schemas.openxmlformats.org/officeDocument/2006/relationships" xmlns:p="http://schemas.openxmlformats.org/presentationml/2006/main">
   <p:cSld>
     <p:spTree>
@@ -12095,7 +12249,7 @@
 </p:sld>
 </file>
 
-<file path=ppt/slides/slide15.xml><?xml version="1.0" encoding="utf-8"?>
+<file path=ppt/slides/slide14.xml><?xml version="1.0" encoding="utf-8"?>
 <p:sld xmlns:a="http://schemas.openxmlformats.org/drawingml/2006/main" xmlns:r="http://schemas.openxmlformats.org/officeDocument/2006/relationships" xmlns:p="http://schemas.openxmlformats.org/presentationml/2006/main">
   <p:cSld>
     <p:spTree>
@@ -12184,6 +12338,193 @@
     <p:extLst>
       <p:ext uri="{BB962C8B-B14F-4D97-AF65-F5344CB8AC3E}">
         <p14:creationId xmlns:p14="http://schemas.microsoft.com/office/powerpoint/2010/main" val="459301213"/>
+      </p:ext>
+    </p:extLst>
+  </p:cSld>
+  <p:clrMapOvr>
+    <a:masterClrMapping/>
+  </p:clrMapOvr>
+</p:sld>
+</file>
+
+<file path=ppt/slides/slide15.xml><?xml version="1.0" encoding="utf-8"?>
+<p:sld xmlns:a="http://schemas.openxmlformats.org/drawingml/2006/main" xmlns:r="http://schemas.openxmlformats.org/officeDocument/2006/relationships" xmlns:p="http://schemas.openxmlformats.org/presentationml/2006/main">
+  <p:cSld>
+    <p:spTree>
+      <p:nvGrpSpPr>
+        <p:cNvPr id="1" name=""/>
+        <p:cNvGrpSpPr/>
+        <p:nvPr/>
+      </p:nvGrpSpPr>
+      <p:grpSpPr>
+        <a:xfrm>
+          <a:off x="0" y="0"/>
+          <a:ext cx="0" cy="0"/>
+          <a:chOff x="0" y="0"/>
+          <a:chExt cx="0" cy="0"/>
+        </a:xfrm>
+      </p:grpSpPr>
+      <p:sp>
+        <p:nvSpPr>
+          <p:cNvPr id="7" name="Title 6">
+            <a:extLst>
+              <a:ext uri="{FF2B5EF4-FFF2-40B4-BE49-F238E27FC236}">
+                <a16:creationId xmlns:a16="http://schemas.microsoft.com/office/drawing/2014/main" id="{F9A813DD-BEB6-B3D7-C855-D5519AE9DEBA}"/>
+              </a:ext>
+            </a:extLst>
+          </p:cNvPr>
+          <p:cNvSpPr>
+            <a:spLocks noGrp="1"/>
+          </p:cNvSpPr>
+          <p:nvPr>
+            <p:ph type="title"/>
+          </p:nvPr>
+        </p:nvSpPr>
+        <p:spPr/>
+        <p:txBody>
+          <a:bodyPr/>
+          <a:lstStyle/>
+          <a:p>
+            <a:r>
+              <a:rPr lang="en-DK" dirty="0"/>
+              <a:t>Learning the potential energy</a:t>
+            </a:r>
+          </a:p>
+        </p:txBody>
+      </p:sp>
+      <p:pic>
+        <p:nvPicPr>
+          <p:cNvPr id="11" name="Picture 10" descr="A graph of a graph with orange dots&#10;&#10;AI-generated content may be incorrect.">
+            <a:extLst>
+              <a:ext uri="{FF2B5EF4-FFF2-40B4-BE49-F238E27FC236}">
+                <a16:creationId xmlns:a16="http://schemas.microsoft.com/office/drawing/2014/main" id="{0266B273-463C-BA2A-D1FE-08C37870DC80}"/>
+              </a:ext>
+            </a:extLst>
+          </p:cNvPr>
+          <p:cNvPicPr>
+            <a:picLocks noChangeAspect="1"/>
+          </p:cNvPicPr>
+          <p:nvPr/>
+        </p:nvPicPr>
+        <p:blipFill>
+          <a:blip r:embed="rId2"/>
+          <a:srcRect b="3167"/>
+          <a:stretch/>
+        </p:blipFill>
+        <p:spPr>
+          <a:xfrm>
+            <a:off x="5903091" y="1690688"/>
+            <a:ext cx="4127500" cy="4132043"/>
+          </a:xfrm>
+          <a:prstGeom prst="rect">
+            <a:avLst/>
+          </a:prstGeom>
+        </p:spPr>
+      </p:pic>
+      <p:pic>
+        <p:nvPicPr>
+          <p:cNvPr id="13" name="Picture 12" descr="A math equation with a square and a number&#10;&#10;AI-generated content may be incorrect.">
+            <a:extLst>
+              <a:ext uri="{FF2B5EF4-FFF2-40B4-BE49-F238E27FC236}">
+                <a16:creationId xmlns:a16="http://schemas.microsoft.com/office/drawing/2014/main" id="{E219753C-1BE2-A6C5-BDAF-FE9F4529C60E}"/>
+              </a:ext>
+            </a:extLst>
+          </p:cNvPr>
+          <p:cNvPicPr>
+            <a:picLocks noChangeAspect="1"/>
+          </p:cNvPicPr>
+          <p:nvPr/>
+        </p:nvPicPr>
+        <p:blipFill>
+          <a:blip r:embed="rId3"/>
+          <a:stretch>
+            <a:fillRect/>
+          </a:stretch>
+        </p:blipFill>
+        <p:spPr>
+          <a:xfrm>
+            <a:off x="1698953" y="3481826"/>
+            <a:ext cx="4127500" cy="1003300"/>
+          </a:xfrm>
+          <a:prstGeom prst="rect">
+            <a:avLst/>
+          </a:prstGeom>
+        </p:spPr>
+      </p:pic>
+      <p:sp>
+        <p:nvSpPr>
+          <p:cNvPr id="14" name="TextBox 13">
+            <a:extLst>
+              <a:ext uri="{FF2B5EF4-FFF2-40B4-BE49-F238E27FC236}">
+                <a16:creationId xmlns:a16="http://schemas.microsoft.com/office/drawing/2014/main" id="{C7063C6A-4C6D-7716-3B76-E7D7ED949EFB}"/>
+              </a:ext>
+            </a:extLst>
+          </p:cNvPr>
+          <p:cNvSpPr txBox="1"/>
+          <p:nvPr/>
+        </p:nvSpPr>
+        <p:spPr>
+          <a:xfrm>
+            <a:off x="1996965" y="2782669"/>
+            <a:ext cx="3829488" cy="646331"/>
+          </a:xfrm>
+          <a:prstGeom prst="rect">
+            <a:avLst/>
+          </a:prstGeom>
+          <a:noFill/>
+        </p:spPr>
+        <p:txBody>
+          <a:bodyPr wrap="square" rtlCol="0">
+            <a:spAutoFit/>
+          </a:bodyPr>
+          <a:lstStyle/>
+          <a:p>
+            <a:r>
+              <a:rPr lang="en-DK" dirty="0"/>
+              <a:t>We will fit the parameters of the Lennard Jones potential</a:t>
+            </a:r>
+          </a:p>
+        </p:txBody>
+      </p:sp>
+      <p:sp>
+        <p:nvSpPr>
+          <p:cNvPr id="15" name="TextBox 14">
+            <a:extLst>
+              <a:ext uri="{FF2B5EF4-FFF2-40B4-BE49-F238E27FC236}">
+                <a16:creationId xmlns:a16="http://schemas.microsoft.com/office/drawing/2014/main" id="{546F5798-FC51-2C17-2478-56B21348ED03}"/>
+              </a:ext>
+            </a:extLst>
+          </p:cNvPr>
+          <p:cNvSpPr txBox="1"/>
+          <p:nvPr/>
+        </p:nvSpPr>
+        <p:spPr>
+          <a:xfrm>
+            <a:off x="8751394" y="767358"/>
+            <a:ext cx="2711669" cy="923330"/>
+          </a:xfrm>
+          <a:prstGeom prst="rect">
+            <a:avLst/>
+          </a:prstGeom>
+          <a:noFill/>
+        </p:spPr>
+        <p:txBody>
+          <a:bodyPr wrap="square" rtlCol="0">
+            <a:spAutoFit/>
+          </a:bodyPr>
+          <a:lstStyle/>
+          <a:p>
+            <a:r>
+              <a:rPr lang="en-DK" dirty="0"/>
+              <a:t>Training data is dimers, really just a pretty simple regression</a:t>
+            </a:r>
+          </a:p>
+        </p:txBody>
+      </p:sp>
+    </p:spTree>
+    <p:extLst>
+      <p:ext uri="{BB962C8B-B14F-4D97-AF65-F5344CB8AC3E}">
+        <p14:creationId xmlns:p14="http://schemas.microsoft.com/office/powerpoint/2010/main" val="2196429559"/>
       </p:ext>
     </p:extLst>
   </p:cSld>
@@ -12212,10 +12553,10 @@
       </p:grpSpPr>
       <p:sp>
         <p:nvSpPr>
-          <p:cNvPr id="7" name="Title 6">
-            <a:extLst>
-              <a:ext uri="{FF2B5EF4-FFF2-40B4-BE49-F238E27FC236}">
-                <a16:creationId xmlns:a16="http://schemas.microsoft.com/office/drawing/2014/main" id="{F9A813DD-BEB6-B3D7-C855-D5519AE9DEBA}"/>
+          <p:cNvPr id="2" name="Title 1">
+            <a:extLst>
+              <a:ext uri="{FF2B5EF4-FFF2-40B4-BE49-F238E27FC236}">
+                <a16:creationId xmlns:a16="http://schemas.microsoft.com/office/drawing/2014/main" id="{60D2C595-555A-9920-0EEC-FDFD9F66FFBC}"/>
               </a:ext>
             </a:extLst>
           </p:cNvPr>
@@ -12240,10 +12581,10 @@
       </p:sp>
       <p:pic>
         <p:nvPicPr>
-          <p:cNvPr id="11" name="Picture 10" descr="A graph of a graph with orange dots&#10;&#10;AI-generated content may be incorrect.">
-            <a:extLst>
-              <a:ext uri="{FF2B5EF4-FFF2-40B4-BE49-F238E27FC236}">
-                <a16:creationId xmlns:a16="http://schemas.microsoft.com/office/drawing/2014/main" id="{0266B273-463C-BA2A-D1FE-08C37870DC80}"/>
+          <p:cNvPr id="7" name="Picture 6" descr="A graph of energy and train&#10;&#10;AI-generated content may be incorrect.">
+            <a:extLst>
+              <a:ext uri="{FF2B5EF4-FFF2-40B4-BE49-F238E27FC236}">
+                <a16:creationId xmlns:a16="http://schemas.microsoft.com/office/drawing/2014/main" id="{DF83CB2B-2541-DBDA-742A-614E7C096F23}"/>
               </a:ext>
             </a:extLst>
           </p:cNvPr>
@@ -12254,25 +12595,60 @@
         </p:nvPicPr>
         <p:blipFill>
           <a:blip r:embed="rId2"/>
-          <a:srcRect b="3167"/>
+          <a:srcRect l="1" r="49191"/>
           <a:stretch/>
         </p:blipFill>
         <p:spPr>
           <a:xfrm>
-            <a:off x="5903091" y="1690688"/>
-            <a:ext cx="4127500" cy="4132043"/>
+            <a:off x="6739926" y="2254658"/>
+            <a:ext cx="3949094" cy="3873940"/>
           </a:xfrm>
           <a:prstGeom prst="rect">
             <a:avLst/>
           </a:prstGeom>
         </p:spPr>
       </p:pic>
+      <p:sp>
+        <p:nvSpPr>
+          <p:cNvPr id="8" name="TextBox 7">
+            <a:extLst>
+              <a:ext uri="{FF2B5EF4-FFF2-40B4-BE49-F238E27FC236}">
+                <a16:creationId xmlns:a16="http://schemas.microsoft.com/office/drawing/2014/main" id="{5CC0A5A4-D678-F3A0-FF42-71CC092A0094}"/>
+              </a:ext>
+            </a:extLst>
+          </p:cNvPr>
+          <p:cNvSpPr txBox="1"/>
+          <p:nvPr/>
+        </p:nvSpPr>
+        <p:spPr>
+          <a:xfrm>
+            <a:off x="838200" y="1933903"/>
+            <a:ext cx="5646683" cy="646331"/>
+          </a:xfrm>
+          <a:prstGeom prst="rect">
+            <a:avLst/>
+          </a:prstGeom>
+          <a:noFill/>
+        </p:spPr>
+        <p:txBody>
+          <a:bodyPr wrap="square" rtlCol="0">
+            <a:spAutoFit/>
+          </a:bodyPr>
+          <a:lstStyle/>
+          <a:p>
+            <a:r>
+              <a:rPr lang="en-DK" dirty="0"/>
+              <a:t>Training with cluster configurations, so now we have data with many dimensions (~60). </a:t>
+            </a:r>
+          </a:p>
+        </p:txBody>
+      </p:sp>
       <p:pic>
         <p:nvPicPr>
-          <p:cNvPr id="13" name="Picture 12" descr="A math equation with a square and a number&#10;&#10;AI-generated content may be incorrect.">
-            <a:extLst>
-              <a:ext uri="{FF2B5EF4-FFF2-40B4-BE49-F238E27FC236}">
-                <a16:creationId xmlns:a16="http://schemas.microsoft.com/office/drawing/2014/main" id="{E219753C-1BE2-A6C5-BDAF-FE9F4529C60E}"/>
+          <p:cNvPr id="11" name="Picture 10" descr="A grid with blue dots&#10;&#10;AI-generated content may be incorrect.">
+            <a:extLst>
+              <a:ext uri="{FF2B5EF4-FFF2-40B4-BE49-F238E27FC236}">
+                <a16:creationId xmlns:a16="http://schemas.microsoft.com/office/drawing/2014/main" id="{DA4421A5-A878-2B0E-6858-95CB63C0BA70}"/>
               </a:ext>
             </a:extLst>
           </p:cNvPr>
@@ -12289,8 +12665,8 @@
         </p:blipFill>
         <p:spPr>
           <a:xfrm>
-            <a:off x="1698953" y="3481826"/>
-            <a:ext cx="4127500" cy="1003300"/>
+            <a:off x="838200" y="3136861"/>
+            <a:ext cx="5765788" cy="2281812"/>
           </a:xfrm>
           <a:prstGeom prst="rect">
             <a:avLst/>
@@ -12299,10 +12675,10 @@
       </p:pic>
       <p:sp>
         <p:nvSpPr>
-          <p:cNvPr id="14" name="TextBox 13">
-            <a:extLst>
-              <a:ext uri="{FF2B5EF4-FFF2-40B4-BE49-F238E27FC236}">
-                <a16:creationId xmlns:a16="http://schemas.microsoft.com/office/drawing/2014/main" id="{C7063C6A-4C6D-7716-3B76-E7D7ED949EFB}"/>
+          <p:cNvPr id="12" name="TextBox 11">
+            <a:extLst>
+              <a:ext uri="{FF2B5EF4-FFF2-40B4-BE49-F238E27FC236}">
+                <a16:creationId xmlns:a16="http://schemas.microsoft.com/office/drawing/2014/main" id="{C2BF9FEA-8484-A73C-803D-E7D6B18CF659}"/>
               </a:ext>
             </a:extLst>
           </p:cNvPr>
@@ -12311,8 +12687,8 @@
         </p:nvSpPr>
         <p:spPr>
           <a:xfrm>
-            <a:off x="1996965" y="2782669"/>
-            <a:ext cx="3829488" cy="646331"/>
+            <a:off x="1671145" y="5507421"/>
+            <a:ext cx="4056993" cy="646331"/>
           </a:xfrm>
           <a:prstGeom prst="rect">
             <a:avLst/>
@@ -12327,17 +12703,17 @@
           <a:p>
             <a:r>
               <a:rPr lang="en-DK" dirty="0"/>
-              <a:t>We will fit the parameters of the Lennard Jones potential</a:t>
+              <a:t>Geometries of some small clusters shown here. </a:t>
             </a:r>
           </a:p>
         </p:txBody>
       </p:sp>
       <p:sp>
         <p:nvSpPr>
-          <p:cNvPr id="15" name="TextBox 14">
-            <a:extLst>
-              <a:ext uri="{FF2B5EF4-FFF2-40B4-BE49-F238E27FC236}">
-                <a16:creationId xmlns:a16="http://schemas.microsoft.com/office/drawing/2014/main" id="{546F5798-FC51-2C17-2478-56B21348ED03}"/>
+          <p:cNvPr id="13" name="TextBox 12">
+            <a:extLst>
+              <a:ext uri="{FF2B5EF4-FFF2-40B4-BE49-F238E27FC236}">
+                <a16:creationId xmlns:a16="http://schemas.microsoft.com/office/drawing/2014/main" id="{2A007CDA-F63A-D75C-5867-7C30B5278E21}"/>
               </a:ext>
             </a:extLst>
           </p:cNvPr>
@@ -12346,8 +12722,8 @@
         </p:nvSpPr>
         <p:spPr>
           <a:xfrm>
-            <a:off x="8751394" y="767358"/>
-            <a:ext cx="2711669" cy="923330"/>
+            <a:off x="7865762" y="1229023"/>
+            <a:ext cx="3615559" cy="923330"/>
           </a:xfrm>
           <a:prstGeom prst="rect">
             <a:avLst/>
@@ -12362,7 +12738,7 @@
           <a:p>
             <a:r>
               <a:rPr lang="en-DK" dirty="0"/>
-              <a:t>Training data is dimers, really just a pretty simple regression</a:t>
+              <a:t>Because the data does not come from the LJ-potential, we cannot get a perfect fit. </a:t>
             </a:r>
           </a:p>
         </p:txBody>
@@ -12370,7 +12746,7 @@
     </p:spTree>
     <p:extLst>
       <p:ext uri="{BB962C8B-B14F-4D97-AF65-F5344CB8AC3E}">
-        <p14:creationId xmlns:p14="http://schemas.microsoft.com/office/powerpoint/2010/main" val="2196429559"/>
+        <p14:creationId xmlns:p14="http://schemas.microsoft.com/office/powerpoint/2010/main" val="1902303785"/>
       </p:ext>
     </p:extLst>
   </p:cSld>
@@ -12402,228 +12778,6 @@
           <p:cNvPr id="2" name="Title 1">
             <a:extLst>
               <a:ext uri="{FF2B5EF4-FFF2-40B4-BE49-F238E27FC236}">
-                <a16:creationId xmlns:a16="http://schemas.microsoft.com/office/drawing/2014/main" id="{60D2C595-555A-9920-0EEC-FDFD9F66FFBC}"/>
-              </a:ext>
-            </a:extLst>
-          </p:cNvPr>
-          <p:cNvSpPr>
-            <a:spLocks noGrp="1"/>
-          </p:cNvSpPr>
-          <p:nvPr>
-            <p:ph type="title"/>
-          </p:nvPr>
-        </p:nvSpPr>
-        <p:spPr/>
-        <p:txBody>
-          <a:bodyPr/>
-          <a:lstStyle/>
-          <a:p>
-            <a:r>
-              <a:rPr lang="en-DK" dirty="0"/>
-              <a:t>Learning the potential energy</a:t>
-            </a:r>
-          </a:p>
-        </p:txBody>
-      </p:sp>
-      <p:pic>
-        <p:nvPicPr>
-          <p:cNvPr id="7" name="Picture 6" descr="A graph of energy and train&#10;&#10;AI-generated content may be incorrect.">
-            <a:extLst>
-              <a:ext uri="{FF2B5EF4-FFF2-40B4-BE49-F238E27FC236}">
-                <a16:creationId xmlns:a16="http://schemas.microsoft.com/office/drawing/2014/main" id="{DF83CB2B-2541-DBDA-742A-614E7C096F23}"/>
-              </a:ext>
-            </a:extLst>
-          </p:cNvPr>
-          <p:cNvPicPr>
-            <a:picLocks noChangeAspect="1"/>
-          </p:cNvPicPr>
-          <p:nvPr/>
-        </p:nvPicPr>
-        <p:blipFill>
-          <a:blip r:embed="rId2"/>
-          <a:srcRect l="1" r="49191"/>
-          <a:stretch/>
-        </p:blipFill>
-        <p:spPr>
-          <a:xfrm>
-            <a:off x="6739926" y="2254658"/>
-            <a:ext cx="3949094" cy="3873940"/>
-          </a:xfrm>
-          <a:prstGeom prst="rect">
-            <a:avLst/>
-          </a:prstGeom>
-        </p:spPr>
-      </p:pic>
-      <p:sp>
-        <p:nvSpPr>
-          <p:cNvPr id="8" name="TextBox 7">
-            <a:extLst>
-              <a:ext uri="{FF2B5EF4-FFF2-40B4-BE49-F238E27FC236}">
-                <a16:creationId xmlns:a16="http://schemas.microsoft.com/office/drawing/2014/main" id="{5CC0A5A4-D678-F3A0-FF42-71CC092A0094}"/>
-              </a:ext>
-            </a:extLst>
-          </p:cNvPr>
-          <p:cNvSpPr txBox="1"/>
-          <p:nvPr/>
-        </p:nvSpPr>
-        <p:spPr>
-          <a:xfrm>
-            <a:off x="838200" y="1933903"/>
-            <a:ext cx="5646683" cy="646331"/>
-          </a:xfrm>
-          <a:prstGeom prst="rect">
-            <a:avLst/>
-          </a:prstGeom>
-          <a:noFill/>
-        </p:spPr>
-        <p:txBody>
-          <a:bodyPr wrap="square" rtlCol="0">
-            <a:spAutoFit/>
-          </a:bodyPr>
-          <a:lstStyle/>
-          <a:p>
-            <a:r>
-              <a:rPr lang="en-DK" dirty="0"/>
-              <a:t>Training with cluster configurations, so now we have data with many dimensions (~60). </a:t>
-            </a:r>
-          </a:p>
-        </p:txBody>
-      </p:sp>
-      <p:pic>
-        <p:nvPicPr>
-          <p:cNvPr id="11" name="Picture 10" descr="A grid with blue dots&#10;&#10;AI-generated content may be incorrect.">
-            <a:extLst>
-              <a:ext uri="{FF2B5EF4-FFF2-40B4-BE49-F238E27FC236}">
-                <a16:creationId xmlns:a16="http://schemas.microsoft.com/office/drawing/2014/main" id="{DA4421A5-A878-2B0E-6858-95CB63C0BA70}"/>
-              </a:ext>
-            </a:extLst>
-          </p:cNvPr>
-          <p:cNvPicPr>
-            <a:picLocks noChangeAspect="1"/>
-          </p:cNvPicPr>
-          <p:nvPr/>
-        </p:nvPicPr>
-        <p:blipFill>
-          <a:blip r:embed="rId3"/>
-          <a:stretch>
-            <a:fillRect/>
-          </a:stretch>
-        </p:blipFill>
-        <p:spPr>
-          <a:xfrm>
-            <a:off x="838200" y="3136861"/>
-            <a:ext cx="5765788" cy="2281812"/>
-          </a:xfrm>
-          <a:prstGeom prst="rect">
-            <a:avLst/>
-          </a:prstGeom>
-        </p:spPr>
-      </p:pic>
-      <p:sp>
-        <p:nvSpPr>
-          <p:cNvPr id="12" name="TextBox 11">
-            <a:extLst>
-              <a:ext uri="{FF2B5EF4-FFF2-40B4-BE49-F238E27FC236}">
-                <a16:creationId xmlns:a16="http://schemas.microsoft.com/office/drawing/2014/main" id="{C2BF9FEA-8484-A73C-803D-E7D6B18CF659}"/>
-              </a:ext>
-            </a:extLst>
-          </p:cNvPr>
-          <p:cNvSpPr txBox="1"/>
-          <p:nvPr/>
-        </p:nvSpPr>
-        <p:spPr>
-          <a:xfrm>
-            <a:off x="1671145" y="5507421"/>
-            <a:ext cx="4056993" cy="646331"/>
-          </a:xfrm>
-          <a:prstGeom prst="rect">
-            <a:avLst/>
-          </a:prstGeom>
-          <a:noFill/>
-        </p:spPr>
-        <p:txBody>
-          <a:bodyPr wrap="square" rtlCol="0">
-            <a:spAutoFit/>
-          </a:bodyPr>
-          <a:lstStyle/>
-          <a:p>
-            <a:r>
-              <a:rPr lang="en-DK" dirty="0"/>
-              <a:t>Geometries of some small clusters shown here. </a:t>
-            </a:r>
-          </a:p>
-        </p:txBody>
-      </p:sp>
-      <p:sp>
-        <p:nvSpPr>
-          <p:cNvPr id="13" name="TextBox 12">
-            <a:extLst>
-              <a:ext uri="{FF2B5EF4-FFF2-40B4-BE49-F238E27FC236}">
-                <a16:creationId xmlns:a16="http://schemas.microsoft.com/office/drawing/2014/main" id="{2A007CDA-F63A-D75C-5867-7C30B5278E21}"/>
-              </a:ext>
-            </a:extLst>
-          </p:cNvPr>
-          <p:cNvSpPr txBox="1"/>
-          <p:nvPr/>
-        </p:nvSpPr>
-        <p:spPr>
-          <a:xfrm>
-            <a:off x="7865762" y="1229023"/>
-            <a:ext cx="3615559" cy="923330"/>
-          </a:xfrm>
-          <a:prstGeom prst="rect">
-            <a:avLst/>
-          </a:prstGeom>
-          <a:noFill/>
-        </p:spPr>
-        <p:txBody>
-          <a:bodyPr wrap="square" rtlCol="0">
-            <a:spAutoFit/>
-          </a:bodyPr>
-          <a:lstStyle/>
-          <a:p>
-            <a:r>
-              <a:rPr lang="en-DK" dirty="0"/>
-              <a:t>Because the data does not come from the LJ-potential, we cannot get a perfect fit. </a:t>
-            </a:r>
-          </a:p>
-        </p:txBody>
-      </p:sp>
-    </p:spTree>
-    <p:extLst>
-      <p:ext uri="{BB962C8B-B14F-4D97-AF65-F5344CB8AC3E}">
-        <p14:creationId xmlns:p14="http://schemas.microsoft.com/office/powerpoint/2010/main" val="1902303785"/>
-      </p:ext>
-    </p:extLst>
-  </p:cSld>
-  <p:clrMapOvr>
-    <a:masterClrMapping/>
-  </p:clrMapOvr>
-</p:sld>
-</file>
-
-<file path=ppt/slides/slide18.xml><?xml version="1.0" encoding="utf-8"?>
-<p:sld xmlns:a="http://schemas.openxmlformats.org/drawingml/2006/main" xmlns:r="http://schemas.openxmlformats.org/officeDocument/2006/relationships" xmlns:p="http://schemas.openxmlformats.org/presentationml/2006/main">
-  <p:cSld>
-    <p:spTree>
-      <p:nvGrpSpPr>
-        <p:cNvPr id="1" name=""/>
-        <p:cNvGrpSpPr/>
-        <p:nvPr/>
-      </p:nvGrpSpPr>
-      <p:grpSpPr>
-        <a:xfrm>
-          <a:off x="0" y="0"/>
-          <a:ext cx="0" cy="0"/>
-          <a:chOff x="0" y="0"/>
-          <a:chExt cx="0" cy="0"/>
-        </a:xfrm>
-      </p:grpSpPr>
-      <p:sp>
-        <p:nvSpPr>
-          <p:cNvPr id="2" name="Title 1">
-            <a:extLst>
-              <a:ext uri="{FF2B5EF4-FFF2-40B4-BE49-F238E27FC236}">
                 <a16:creationId xmlns:a16="http://schemas.microsoft.com/office/drawing/2014/main" id="{0F163DBA-EC5D-55D8-0AE2-526317896EB2}"/>
               </a:ext>
             </a:extLst>
@@ -12677,8 +12831,8 @@
           </a:prstGeom>
         </p:spPr>
       </p:pic>
-      <mc:AlternateContent xmlns:mc="http://schemas.openxmlformats.org/markup-compatibility/2006">
-        <mc:Choice xmlns:a14="http://schemas.microsoft.com/office/drawing/2010/main" Requires="a14">
+      <mc:AlternateContent xmlns:mc="http://schemas.openxmlformats.org/markup-compatibility/2006" xmlns:a14="http://schemas.microsoft.com/office/drawing/2010/main">
+        <mc:Choice Requires="a14">
           <p:sp>
             <p:nvSpPr>
               <p:cNvPr id="5" name="TextBox 4">
@@ -12707,6 +12861,7 @@
               </a:bodyPr>
               <a:lstStyle/>
               <a:p>
+                <a:pPr/>
                 <a14:m>
                   <m:oMathPara xmlns:m="http://schemas.openxmlformats.org/officeDocument/2006/math">
                     <m:oMathParaPr>
@@ -12770,7 +12925,7 @@
             </p:txBody>
           </p:sp>
         </mc:Choice>
-        <mc:Fallback>
+        <mc:Fallback xmlns="">
           <p:sp>
             <p:nvSpPr>
               <p:cNvPr id="5" name="TextBox 4">
@@ -12946,7 +13101,7 @@
 </p:sld>
 </file>
 
-<file path=ppt/slides/slide19.xml><?xml version="1.0" encoding="utf-8"?>
+<file path=ppt/slides/slide18.xml><?xml version="1.0" encoding="utf-8"?>
 <p:sld xmlns:a="http://schemas.openxmlformats.org/drawingml/2006/main" xmlns:r="http://schemas.openxmlformats.org/officeDocument/2006/relationships" xmlns:p="http://schemas.openxmlformats.org/presentationml/2006/main">
   <p:cSld>
     <p:spTree>
@@ -13260,8 +13415,8 @@
           </a:extLst>
         </p:spPr>
       </p:pic>
-      <mc:AlternateContent xmlns:mc="http://schemas.openxmlformats.org/markup-compatibility/2006">
-        <mc:Choice xmlns:a14="http://schemas.microsoft.com/office/drawing/2010/main" Requires="a14">
+      <mc:AlternateContent xmlns:mc="http://schemas.openxmlformats.org/markup-compatibility/2006" xmlns:a14="http://schemas.microsoft.com/office/drawing/2010/main">
+        <mc:Choice Requires="a14">
           <p:sp>
             <p:nvSpPr>
               <p:cNvPr id="7" name="TextBox 6">
@@ -13304,7 +13459,7 @@
                         <m:nor/>
                       </m:rPr>
                       <a:rPr lang="en-GB"/>
-                      <m:t>-</m:t>
+                      <m:t>−</m:t>
                     </m:r>
                     <m:r>
                       <m:rPr>
@@ -13337,7 +13492,7 @@
             </p:txBody>
           </p:sp>
         </mc:Choice>
-        <mc:Fallback>
+        <mc:Fallback xmlns="">
           <p:sp>
             <p:nvSpPr>
               <p:cNvPr id="7" name="TextBox 6">
@@ -13417,7 +13572,7 @@
           <p:cNvPr id="2" name="Title 1">
             <a:extLst>
               <a:ext uri="{FF2B5EF4-FFF2-40B4-BE49-F238E27FC236}">
-                <a16:creationId xmlns:a16="http://schemas.microsoft.com/office/drawing/2014/main" id="{88AFB721-957D-BEE9-9587-64D7185C6BE4}"/>
+                <a16:creationId xmlns:a16="http://schemas.microsoft.com/office/drawing/2014/main" id="{1106E9E6-1F67-36AA-96C8-1306EA9B6CA3}"/>
               </a:ext>
             </a:extLst>
           </p:cNvPr>
@@ -13435,292 +13590,17 @@
           <a:p>
             <a:r>
               <a:rPr lang="en-DK" dirty="0"/>
-              <a:t>Recap: Derivatives using torch</a:t>
+              <a:t>Recap: Electric field from scalar potential </a:t>
             </a:r>
           </a:p>
         </p:txBody>
       </p:sp>
-      <mc:AlternateContent xmlns:mc="http://schemas.openxmlformats.org/markup-compatibility/2006">
-        <mc:Choice xmlns:a14="http://schemas.microsoft.com/office/drawing/2010/main" Requires="a14">
-          <p:sp>
-            <p:nvSpPr>
-              <p:cNvPr id="4" name="TextBox 3">
-                <a:extLst>
-                  <a:ext uri="{FF2B5EF4-FFF2-40B4-BE49-F238E27FC236}">
-                    <a16:creationId xmlns:a16="http://schemas.microsoft.com/office/drawing/2014/main" id="{1AD5FA00-C094-226A-D142-D5B12BFA17A3}"/>
-                  </a:ext>
-                </a:extLst>
-              </p:cNvPr>
-              <p:cNvSpPr txBox="1"/>
-              <p:nvPr/>
-            </p:nvSpPr>
-            <p:spPr>
-              <a:xfrm>
-                <a:off x="1699889" y="3046522"/>
-                <a:ext cx="1857303" cy="492443"/>
-              </a:xfrm>
-              <a:prstGeom prst="rect">
-                <a:avLst/>
-              </a:prstGeom>
-              <a:noFill/>
-            </p:spPr>
-            <p:txBody>
-              <a:bodyPr wrap="none" lIns="0" tIns="0" rIns="0" bIns="0" rtlCol="0">
-                <a:spAutoFit/>
-              </a:bodyPr>
-              <a:lstStyle/>
-              <a:p>
-                <a:pPr/>
-                <a14:m>
-                  <m:oMathPara xmlns:m="http://schemas.openxmlformats.org/officeDocument/2006/math">
-                    <m:oMathParaPr>
-                      <m:jc m:val="centerGroup"/>
-                    </m:oMathParaPr>
-                    <m:oMath xmlns:m="http://schemas.openxmlformats.org/officeDocument/2006/math">
-                      <m:r>
-                        <a:rPr lang="da-DK" sz="3200" b="0" i="1" smtClean="0">
-                          <a:latin typeface="Cambria Math" panose="02040503050406030204" pitchFamily="18" charset="0"/>
-                        </a:rPr>
-                        <m:t>𝑓</m:t>
-                      </m:r>
-                      <m:d>
-                        <m:dPr>
-                          <m:ctrlPr>
-                            <a:rPr lang="da-DK" sz="3200" b="0" i="1" smtClean="0">
-                              <a:latin typeface="Cambria Math" panose="02040503050406030204" pitchFamily="18" charset="0"/>
-                            </a:rPr>
-                          </m:ctrlPr>
-                        </m:dPr>
-                        <m:e>
-                          <m:r>
-                            <a:rPr lang="da-DK" sz="3200" b="0" i="1" smtClean="0">
-                              <a:latin typeface="Cambria Math" panose="02040503050406030204" pitchFamily="18" charset="0"/>
-                            </a:rPr>
-                            <m:t>𝑥</m:t>
-                          </m:r>
-                        </m:e>
-                      </m:d>
-                      <m:r>
-                        <a:rPr lang="da-DK" sz="3200" b="0" i="1" smtClean="0">
-                          <a:latin typeface="Cambria Math" panose="02040503050406030204" pitchFamily="18" charset="0"/>
-                        </a:rPr>
-                        <m:t>=</m:t>
-                      </m:r>
-                      <m:sSup>
-                        <m:sSupPr>
-                          <m:ctrlPr>
-                            <a:rPr lang="da-DK" sz="3200" b="0" i="1" smtClean="0">
-                              <a:latin typeface="Cambria Math" panose="02040503050406030204" pitchFamily="18" charset="0"/>
-                            </a:rPr>
-                          </m:ctrlPr>
-                        </m:sSupPr>
-                        <m:e>
-                          <m:r>
-                            <a:rPr lang="da-DK" sz="3200" b="0" i="1" smtClean="0">
-                              <a:latin typeface="Cambria Math" panose="02040503050406030204" pitchFamily="18" charset="0"/>
-                            </a:rPr>
-                            <m:t>𝑥</m:t>
-                          </m:r>
-                        </m:e>
-                        <m:sup>
-                          <m:r>
-                            <a:rPr lang="da-DK" sz="3200" b="0" i="1" smtClean="0">
-                              <a:latin typeface="Cambria Math" panose="02040503050406030204" pitchFamily="18" charset="0"/>
-                            </a:rPr>
-                            <m:t>2</m:t>
-                          </m:r>
-                        </m:sup>
-                      </m:sSup>
-                    </m:oMath>
-                  </m:oMathPara>
-                </a14:m>
-                <a:endParaRPr lang="en-DK" sz="3200" dirty="0"/>
-              </a:p>
-            </p:txBody>
-          </p:sp>
-        </mc:Choice>
-        <mc:Fallback>
-          <p:sp>
-            <p:nvSpPr>
-              <p:cNvPr id="4" name="TextBox 3">
-                <a:extLst>
-                  <a:ext uri="{FF2B5EF4-FFF2-40B4-BE49-F238E27FC236}">
-                    <a16:creationId xmlns:a16="http://schemas.microsoft.com/office/drawing/2014/main" id="{1AD5FA00-C094-226A-D142-D5B12BFA17A3}"/>
-                  </a:ext>
-                </a:extLst>
-              </p:cNvPr>
-              <p:cNvSpPr txBox="1">
-                <a:spLocks noRot="1" noChangeAspect="1" noMove="1" noResize="1" noEditPoints="1" noAdjustHandles="1" noChangeArrowheads="1" noChangeShapeType="1" noTextEdit="1"/>
-              </p:cNvSpPr>
-              <p:nvPr/>
-            </p:nvSpPr>
-            <p:spPr>
-              <a:xfrm>
-                <a:off x="1699889" y="3046522"/>
-                <a:ext cx="1857303" cy="492443"/>
-              </a:xfrm>
-              <a:prstGeom prst="rect">
-                <a:avLst/>
-              </a:prstGeom>
-              <a:blipFill>
-                <a:blip r:embed="rId2"/>
-                <a:stretch>
-                  <a:fillRect l="-7432" t="-2564" r="-1351" b="-33333"/>
-                </a:stretch>
-              </a:blipFill>
-            </p:spPr>
-            <p:txBody>
-              <a:bodyPr/>
-              <a:lstStyle/>
-              <a:p>
-                <a:r>
-                  <a:rPr lang="en-DK">
-                    <a:noFill/>
-                  </a:rPr>
-                  <a:t> </a:t>
-                </a:r>
-              </a:p>
-            </p:txBody>
-          </p:sp>
-        </mc:Fallback>
-      </mc:AlternateContent>
-      <mc:AlternateContent xmlns:mc="http://schemas.openxmlformats.org/markup-compatibility/2006">
-        <mc:Choice xmlns:a14="http://schemas.microsoft.com/office/drawing/2010/main" Requires="a14">
-          <p:sp>
-            <p:nvSpPr>
-              <p:cNvPr id="5" name="TextBox 4">
-                <a:extLst>
-                  <a:ext uri="{FF2B5EF4-FFF2-40B4-BE49-F238E27FC236}">
-                    <a16:creationId xmlns:a16="http://schemas.microsoft.com/office/drawing/2014/main" id="{27C2E11E-4B04-09DE-986A-9C3D894FEA23}"/>
-                  </a:ext>
-                </a:extLst>
-              </p:cNvPr>
-              <p:cNvSpPr txBox="1"/>
-              <p:nvPr/>
-            </p:nvSpPr>
-            <p:spPr>
-              <a:xfrm>
-                <a:off x="1639296" y="3850957"/>
-                <a:ext cx="1978490" cy="492443"/>
-              </a:xfrm>
-              <a:prstGeom prst="rect">
-                <a:avLst/>
-              </a:prstGeom>
-              <a:noFill/>
-            </p:spPr>
-            <p:txBody>
-              <a:bodyPr wrap="none" lIns="0" tIns="0" rIns="0" bIns="0" rtlCol="0">
-                <a:spAutoFit/>
-              </a:bodyPr>
-              <a:lstStyle/>
-              <a:p>
-                <a:pPr/>
-                <a14:m>
-                  <m:oMathPara xmlns:m="http://schemas.openxmlformats.org/officeDocument/2006/math">
-                    <m:oMathParaPr>
-                      <m:jc m:val="centerGroup"/>
-                    </m:oMathParaPr>
-                    <m:oMath xmlns:m="http://schemas.openxmlformats.org/officeDocument/2006/math">
-                      <m:r>
-                        <a:rPr lang="da-DK" sz="3200" b="0" i="1" smtClean="0">
-                          <a:latin typeface="Cambria Math" panose="02040503050406030204" pitchFamily="18" charset="0"/>
-                        </a:rPr>
-                        <m:t>𝑓</m:t>
-                      </m:r>
-                      <m:r>
-                        <a:rPr lang="da-DK" sz="3200" b="0" i="1" smtClean="0">
-                          <a:latin typeface="Cambria Math" panose="02040503050406030204" pitchFamily="18" charset="0"/>
-                        </a:rPr>
-                        <m:t>′</m:t>
-                      </m:r>
-                      <m:d>
-                        <m:dPr>
-                          <m:ctrlPr>
-                            <a:rPr lang="da-DK" sz="3200" b="0" i="1" smtClean="0">
-                              <a:latin typeface="Cambria Math" panose="02040503050406030204" pitchFamily="18" charset="0"/>
-                            </a:rPr>
-                          </m:ctrlPr>
-                        </m:dPr>
-                        <m:e>
-                          <m:r>
-                            <a:rPr lang="da-DK" sz="3200" b="0" i="1" smtClean="0">
-                              <a:latin typeface="Cambria Math" panose="02040503050406030204" pitchFamily="18" charset="0"/>
-                            </a:rPr>
-                            <m:t>𝑥</m:t>
-                          </m:r>
-                        </m:e>
-                      </m:d>
-                      <m:r>
-                        <a:rPr lang="da-DK" sz="3200" b="0" i="1" smtClean="0">
-                          <a:latin typeface="Cambria Math" panose="02040503050406030204" pitchFamily="18" charset="0"/>
-                        </a:rPr>
-                        <m:t>=2</m:t>
-                      </m:r>
-                      <m:r>
-                        <a:rPr lang="da-DK" sz="3200" b="0" i="1" smtClean="0">
-                          <a:latin typeface="Cambria Math" panose="02040503050406030204" pitchFamily="18" charset="0"/>
-                        </a:rPr>
-                        <m:t>𝑥</m:t>
-                      </m:r>
-                    </m:oMath>
-                  </m:oMathPara>
-                </a14:m>
-                <a:endParaRPr lang="en-DK" sz="3200" dirty="0"/>
-              </a:p>
-            </p:txBody>
-          </p:sp>
-        </mc:Choice>
-        <mc:Fallback>
-          <p:sp>
-            <p:nvSpPr>
-              <p:cNvPr id="5" name="TextBox 4">
-                <a:extLst>
-                  <a:ext uri="{FF2B5EF4-FFF2-40B4-BE49-F238E27FC236}">
-                    <a16:creationId xmlns:a16="http://schemas.microsoft.com/office/drawing/2014/main" id="{27C2E11E-4B04-09DE-986A-9C3D894FEA23}"/>
-                  </a:ext>
-                </a:extLst>
-              </p:cNvPr>
-              <p:cNvSpPr txBox="1">
-                <a:spLocks noRot="1" noChangeAspect="1" noMove="1" noResize="1" noEditPoints="1" noAdjustHandles="1" noChangeArrowheads="1" noChangeShapeType="1" noTextEdit="1"/>
-              </p:cNvSpPr>
-              <p:nvPr/>
-            </p:nvSpPr>
-            <p:spPr>
-              <a:xfrm>
-                <a:off x="1639296" y="3850957"/>
-                <a:ext cx="1978490" cy="492443"/>
-              </a:xfrm>
-              <a:prstGeom prst="rect">
-                <a:avLst/>
-              </a:prstGeom>
-              <a:blipFill>
-                <a:blip r:embed="rId3"/>
-                <a:stretch>
-                  <a:fillRect l="-8333" t="-7500" r="-3846" b="-35000"/>
-                </a:stretch>
-              </a:blipFill>
-            </p:spPr>
-            <p:txBody>
-              <a:bodyPr/>
-              <a:lstStyle/>
-              <a:p>
-                <a:r>
-                  <a:rPr lang="en-DK">
-                    <a:noFill/>
-                  </a:rPr>
-                  <a:t> </a:t>
-                </a:r>
-              </a:p>
-            </p:txBody>
-          </p:sp>
-        </mc:Fallback>
-      </mc:AlternateContent>
       <p:pic>
         <p:nvPicPr>
-          <p:cNvPr id="6" name="Picture 5" descr="A computer screen shot of a program&#10;&#10;AI-generated content may be incorrect.">
-            <a:extLst>
-              <a:ext uri="{FF2B5EF4-FFF2-40B4-BE49-F238E27FC236}">
-                <a16:creationId xmlns:a16="http://schemas.microsoft.com/office/drawing/2014/main" id="{3670246A-3238-048F-F0CA-292C9B7A0A49}"/>
+          <p:cNvPr id="12" name="Picture 11" descr="A black and white image of a circular pattern&#10;&#10;AI-generated content may be incorrect.">
+            <a:extLst>
+              <a:ext uri="{FF2B5EF4-FFF2-40B4-BE49-F238E27FC236}">
+                <a16:creationId xmlns:a16="http://schemas.microsoft.com/office/drawing/2014/main" id="{B2436261-B57D-7EED-7314-F630D39FC9A5}"/>
               </a:ext>
             </a:extLst>
           </p:cNvPr>
@@ -13730,35 +13610,25 @@
           <p:nvPr/>
         </p:nvPicPr>
         <p:blipFill>
-          <a:blip r:embed="rId4"/>
+          <a:blip r:embed="rId2"/>
           <a:stretch>
             <a:fillRect/>
           </a:stretch>
         </p:blipFill>
         <p:spPr>
           <a:xfrm>
-            <a:off x="4645135" y="2122657"/>
-            <a:ext cx="6057494" cy="3456600"/>
+            <a:off x="3587313" y="1786320"/>
+            <a:ext cx="4533900" cy="4546600"/>
           </a:xfrm>
           <a:prstGeom prst="rect">
             <a:avLst/>
           </a:prstGeom>
-          <a:ln>
-            <a:noFill/>
-          </a:ln>
-          <a:effectLst>
-            <a:outerShdw blurRad="292100" dist="139700" dir="2700000" algn="tl" rotWithShape="0">
-              <a:srgbClr val="333333">
-                <a:alpha val="65000"/>
-              </a:srgbClr>
-            </a:outerShdw>
-          </a:effectLst>
         </p:spPr>
       </p:pic>
     </p:spTree>
     <p:extLst>
       <p:ext uri="{BB962C8B-B14F-4D97-AF65-F5344CB8AC3E}">
-        <p14:creationId xmlns:p14="http://schemas.microsoft.com/office/powerpoint/2010/main" val="1071640773"/>
+        <p14:creationId xmlns:p14="http://schemas.microsoft.com/office/powerpoint/2010/main" val="3241376535"/>
       </p:ext>
     </p:extLst>
   </p:cSld>
@@ -13787,94 +13657,6 @@
       </p:grpSpPr>
       <p:sp>
         <p:nvSpPr>
-          <p:cNvPr id="2" name="Title 1">
-            <a:extLst>
-              <a:ext uri="{FF2B5EF4-FFF2-40B4-BE49-F238E27FC236}">
-                <a16:creationId xmlns:a16="http://schemas.microsoft.com/office/drawing/2014/main" id="{1106E9E6-1F67-36AA-96C8-1306EA9B6CA3}"/>
-              </a:ext>
-            </a:extLst>
-          </p:cNvPr>
-          <p:cNvSpPr>
-            <a:spLocks noGrp="1"/>
-          </p:cNvSpPr>
-          <p:nvPr>
-            <p:ph type="title"/>
-          </p:nvPr>
-        </p:nvSpPr>
-        <p:spPr/>
-        <p:txBody>
-          <a:bodyPr/>
-          <a:lstStyle/>
-          <a:p>
-            <a:r>
-              <a:rPr lang="en-DK" dirty="0"/>
-              <a:t>Recap: Electric field from scalar potential </a:t>
-            </a:r>
-          </a:p>
-        </p:txBody>
-      </p:sp>
-      <p:pic>
-        <p:nvPicPr>
-          <p:cNvPr id="12" name="Picture 11" descr="A black and white image of a circular pattern&#10;&#10;AI-generated content may be incorrect.">
-            <a:extLst>
-              <a:ext uri="{FF2B5EF4-FFF2-40B4-BE49-F238E27FC236}">
-                <a16:creationId xmlns:a16="http://schemas.microsoft.com/office/drawing/2014/main" id="{B2436261-B57D-7EED-7314-F630D39FC9A5}"/>
-              </a:ext>
-            </a:extLst>
-          </p:cNvPr>
-          <p:cNvPicPr>
-            <a:picLocks noChangeAspect="1"/>
-          </p:cNvPicPr>
-          <p:nvPr/>
-        </p:nvPicPr>
-        <p:blipFill>
-          <a:blip r:embed="rId2"/>
-          <a:stretch>
-            <a:fillRect/>
-          </a:stretch>
-        </p:blipFill>
-        <p:spPr>
-          <a:xfrm>
-            <a:off x="5731423" y="1817851"/>
-            <a:ext cx="4533900" cy="4546600"/>
-          </a:xfrm>
-          <a:prstGeom prst="rect">
-            <a:avLst/>
-          </a:prstGeom>
-        </p:spPr>
-      </p:pic>
-    </p:spTree>
-    <p:extLst>
-      <p:ext uri="{BB962C8B-B14F-4D97-AF65-F5344CB8AC3E}">
-        <p14:creationId xmlns:p14="http://schemas.microsoft.com/office/powerpoint/2010/main" val="3241376535"/>
-      </p:ext>
-    </p:extLst>
-  </p:cSld>
-  <p:clrMapOvr>
-    <a:masterClrMapping/>
-  </p:clrMapOvr>
-</p:sld>
-</file>
-
-<file path=ppt/slides/slide4.xml><?xml version="1.0" encoding="utf-8"?>
-<p:sld xmlns:a="http://schemas.openxmlformats.org/drawingml/2006/main" xmlns:r="http://schemas.openxmlformats.org/officeDocument/2006/relationships" xmlns:p="http://schemas.openxmlformats.org/presentationml/2006/main">
-  <p:cSld>
-    <p:spTree>
-      <p:nvGrpSpPr>
-        <p:cNvPr id="1" name=""/>
-        <p:cNvGrpSpPr/>
-        <p:nvPr/>
-      </p:nvGrpSpPr>
-      <p:grpSpPr>
-        <a:xfrm>
-          <a:off x="0" y="0"/>
-          <a:ext cx="0" cy="0"/>
-          <a:chOff x="0" y="0"/>
-          <a:chExt cx="0" cy="0"/>
-        </a:xfrm>
-      </p:grpSpPr>
-      <p:sp>
-        <p:nvSpPr>
           <p:cNvPr id="4" name="Title 1">
             <a:extLst>
               <a:ext uri="{FF2B5EF4-FFF2-40B4-BE49-F238E27FC236}">
@@ -14001,8 +13783,8 @@
           </a:p>
         </p:txBody>
       </p:sp>
-      <mc:AlternateContent xmlns:mc="http://schemas.openxmlformats.org/markup-compatibility/2006">
-        <mc:Choice xmlns:a14="http://schemas.microsoft.com/office/drawing/2010/main" Requires="a14">
+      <mc:AlternateContent xmlns:mc="http://schemas.openxmlformats.org/markup-compatibility/2006" xmlns:a14="http://schemas.microsoft.com/office/drawing/2010/main">
+        <mc:Choice Requires="a14">
           <p:sp>
             <p:nvSpPr>
               <p:cNvPr id="8" name="TextBox 7">
@@ -14081,7 +13863,7 @@
             </p:txBody>
           </p:sp>
         </mc:Choice>
-        <mc:Fallback>
+        <mc:Fallback xmlns="">
           <p:sp>
             <p:nvSpPr>
               <p:cNvPr id="8" name="TextBox 7">
@@ -14221,7 +14003,7 @@
 </p:sld>
 </file>
 
-<file path=ppt/slides/slide5.xml><?xml version="1.0" encoding="utf-8"?>
+<file path=ppt/slides/slide4.xml><?xml version="1.0" encoding="utf-8"?>
 <p:sld xmlns:a="http://schemas.openxmlformats.org/drawingml/2006/main" xmlns:r="http://schemas.openxmlformats.org/officeDocument/2006/relationships" xmlns:p="http://schemas.openxmlformats.org/presentationml/2006/main">
   <p:cSld>
     <p:spTree>
@@ -14345,7 +14127,7 @@
 </p:sld>
 </file>
 
-<file path=ppt/slides/slide6.xml><?xml version="1.0" encoding="utf-8"?>
+<file path=ppt/slides/slide5.xml><?xml version="1.0" encoding="utf-8"?>
 <p:sld xmlns:a="http://schemas.openxmlformats.org/drawingml/2006/main" xmlns:r="http://schemas.openxmlformats.org/officeDocument/2006/relationships" xmlns:p="http://schemas.openxmlformats.org/presentationml/2006/main">
   <p:cSld>
     <p:spTree>
@@ -14542,7 +14324,7 @@
 </p:sld>
 </file>
 
-<file path=ppt/slides/slide7.xml><?xml version="1.0" encoding="utf-8"?>
+<file path=ppt/slides/slide6.xml><?xml version="1.0" encoding="utf-8"?>
 <p:sld xmlns:a="http://schemas.openxmlformats.org/drawingml/2006/main" xmlns:r="http://schemas.openxmlformats.org/officeDocument/2006/relationships" xmlns:p="http://schemas.openxmlformats.org/presentationml/2006/main">
   <p:cSld>
     <p:spTree>
@@ -14852,7 +14634,7 @@
 </p:sld>
 </file>
 
-<file path=ppt/slides/slide8.xml><?xml version="1.0" encoding="utf-8"?>
+<file path=ppt/slides/slide7.xml><?xml version="1.0" encoding="utf-8"?>
 <p:sld xmlns:a="http://schemas.openxmlformats.org/drawingml/2006/main" xmlns:r="http://schemas.openxmlformats.org/officeDocument/2006/relationships" xmlns:p="http://schemas.openxmlformats.org/presentationml/2006/main">
   <p:cSld>
     <p:spTree>
@@ -14910,7 +14692,7 @@
 </p:sld>
 </file>
 
-<file path=ppt/slides/slide9.xml><?xml version="1.0" encoding="utf-8"?>
+<file path=ppt/slides/slide8.xml><?xml version="1.0" encoding="utf-8"?>
 <p:sld xmlns:a="http://schemas.openxmlformats.org/drawingml/2006/main" xmlns:r="http://schemas.openxmlformats.org/officeDocument/2006/relationships" xmlns:p="http://schemas.openxmlformats.org/presentationml/2006/main">
   <p:cSld>
     <p:spTree>
@@ -15900,8 +15682,8 @@
           </a:p>
         </p:txBody>
       </p:sp>
-      <mc:AlternateContent xmlns:mc="http://schemas.openxmlformats.org/markup-compatibility/2006">
-        <mc:Choice xmlns:a14="http://schemas.microsoft.com/office/drawing/2010/main" Requires="a14">
+      <mc:AlternateContent xmlns:mc="http://schemas.openxmlformats.org/markup-compatibility/2006" xmlns:a14="http://schemas.microsoft.com/office/drawing/2010/main">
+        <mc:Choice Requires="a14">
           <p:sp>
             <p:nvSpPr>
               <p:cNvPr id="21" name="TextBox 20">
@@ -15939,6 +15721,7 @@
                 <a:endParaRPr lang="en-DK" sz="2400" dirty="0"/>
               </a:p>
               <a:p>
+                <a:pPr/>
                 <a14:m>
                   <m:oMathPara xmlns:m="http://schemas.openxmlformats.org/officeDocument/2006/math">
                     <m:oMathParaPr>
@@ -16096,7 +15879,7 @@
             </p:txBody>
           </p:sp>
         </mc:Choice>
-        <mc:Fallback>
+        <mc:Fallback xmlns="">
           <p:sp>
             <p:nvSpPr>
               <p:cNvPr id="21" name="TextBox 20">
@@ -16145,6 +15928,171 @@
     <p:extLst>
       <p:ext uri="{BB962C8B-B14F-4D97-AF65-F5344CB8AC3E}">
         <p14:creationId xmlns:p14="http://schemas.microsoft.com/office/powerpoint/2010/main" val="2583328572"/>
+      </p:ext>
+    </p:extLst>
+  </p:cSld>
+  <p:clrMapOvr>
+    <a:masterClrMapping/>
+  </p:clrMapOvr>
+</p:sld>
+</file>
+
+<file path=ppt/slides/slide9.xml><?xml version="1.0" encoding="utf-8"?>
+<p:sld xmlns:a="http://schemas.openxmlformats.org/drawingml/2006/main" xmlns:r="http://schemas.openxmlformats.org/officeDocument/2006/relationships" xmlns:p="http://schemas.openxmlformats.org/presentationml/2006/main">
+  <p:cSld>
+    <p:spTree>
+      <p:nvGrpSpPr>
+        <p:cNvPr id="1" name=""/>
+        <p:cNvGrpSpPr/>
+        <p:nvPr/>
+      </p:nvGrpSpPr>
+      <p:grpSpPr>
+        <a:xfrm>
+          <a:off x="0" y="0"/>
+          <a:ext cx="0" cy="0"/>
+          <a:chOff x="0" y="0"/>
+          <a:chExt cx="0" cy="0"/>
+        </a:xfrm>
+      </p:grpSpPr>
+      <p:sp>
+        <p:nvSpPr>
+          <p:cNvPr id="2" name="Title 1">
+            <a:extLst>
+              <a:ext uri="{FF2B5EF4-FFF2-40B4-BE49-F238E27FC236}">
+                <a16:creationId xmlns:a16="http://schemas.microsoft.com/office/drawing/2014/main" id="{B82B09A3-D92F-D949-C118-7C1BABF0174C}"/>
+              </a:ext>
+            </a:extLst>
+          </p:cNvPr>
+          <p:cNvSpPr>
+            <a:spLocks noGrp="1"/>
+          </p:cNvSpPr>
+          <p:nvPr>
+            <p:ph type="title"/>
+          </p:nvPr>
+        </p:nvSpPr>
+        <p:spPr/>
+        <p:txBody>
+          <a:bodyPr/>
+          <a:lstStyle/>
+          <a:p>
+            <a:r>
+              <a:rPr lang="en-DK" dirty="0"/>
+              <a:t>Atoms</a:t>
+            </a:r>
+          </a:p>
+        </p:txBody>
+      </p:sp>
+      <p:pic>
+        <p:nvPicPr>
+          <p:cNvPr id="6" name="Picture 5">
+            <a:extLst>
+              <a:ext uri="{FF2B5EF4-FFF2-40B4-BE49-F238E27FC236}">
+                <a16:creationId xmlns:a16="http://schemas.microsoft.com/office/drawing/2014/main" id="{2841D1F3-6D21-DF55-D686-AEDEE6A17CE1}"/>
+              </a:ext>
+            </a:extLst>
+          </p:cNvPr>
+          <p:cNvPicPr>
+            <a:picLocks noChangeAspect="1"/>
+          </p:cNvPicPr>
+          <p:nvPr/>
+        </p:nvPicPr>
+        <p:blipFill>
+          <a:blip r:embed="rId2"/>
+          <a:stretch>
+            <a:fillRect/>
+          </a:stretch>
+        </p:blipFill>
+        <p:spPr>
+          <a:xfrm>
+            <a:off x="739237" y="2816192"/>
+            <a:ext cx="10614563" cy="1110525"/>
+          </a:xfrm>
+          <a:prstGeom prst="rect">
+            <a:avLst/>
+          </a:prstGeom>
+        </p:spPr>
+      </p:pic>
+      <p:sp>
+        <p:nvSpPr>
+          <p:cNvPr id="7" name="TextBox 6">
+            <a:extLst>
+              <a:ext uri="{FF2B5EF4-FFF2-40B4-BE49-F238E27FC236}">
+                <a16:creationId xmlns:a16="http://schemas.microsoft.com/office/drawing/2014/main" id="{898CFF2D-BA6B-8134-2C5E-C09B4A3D877F}"/>
+              </a:ext>
+            </a:extLst>
+          </p:cNvPr>
+          <p:cNvSpPr txBox="1"/>
+          <p:nvPr/>
+        </p:nvSpPr>
+        <p:spPr>
+          <a:xfrm>
+            <a:off x="1206504" y="2436350"/>
+            <a:ext cx="9680027" cy="369332"/>
+          </a:xfrm>
+          <a:prstGeom prst="rect">
+            <a:avLst/>
+          </a:prstGeom>
+          <a:noFill/>
+        </p:spPr>
+        <p:txBody>
+          <a:bodyPr wrap="square" rtlCol="0">
+            <a:spAutoFit/>
+          </a:bodyPr>
+          <a:lstStyle/>
+          <a:p>
+            <a:r>
+              <a:rPr lang="en-GB" dirty="0"/>
+              <a:t>The many-electron time-independent Schrödinger equation is what governs at the atomic scale </a:t>
+            </a:r>
+            <a:endParaRPr lang="en-DK" dirty="0"/>
+          </a:p>
+        </p:txBody>
+      </p:sp>
+      <p:sp>
+        <p:nvSpPr>
+          <p:cNvPr id="8" name="TextBox 7">
+            <a:extLst>
+              <a:ext uri="{FF2B5EF4-FFF2-40B4-BE49-F238E27FC236}">
+                <a16:creationId xmlns:a16="http://schemas.microsoft.com/office/drawing/2014/main" id="{E6DE4961-3E1B-1453-0C86-6A6F161C6C75}"/>
+              </a:ext>
+            </a:extLst>
+          </p:cNvPr>
+          <p:cNvSpPr txBox="1"/>
+          <p:nvPr/>
+        </p:nvSpPr>
+        <p:spPr>
+          <a:xfrm>
+            <a:off x="1206503" y="4060199"/>
+            <a:ext cx="9680027" cy="646331"/>
+          </a:xfrm>
+          <a:prstGeom prst="rect">
+            <a:avLst/>
+          </a:prstGeom>
+          <a:noFill/>
+        </p:spPr>
+        <p:txBody>
+          <a:bodyPr wrap="square" rtlCol="0">
+            <a:spAutoFit/>
+          </a:bodyPr>
+          <a:lstStyle/>
+          <a:p>
+            <a:r>
+              <a:rPr lang="en-DK" dirty="0"/>
+              <a:t>Generally unsolvable – so that’s a nice starting point. However, plenty of approximations exists, </a:t>
+            </a:r>
+          </a:p>
+          <a:p>
+            <a:r>
+              <a:rPr lang="en-DK" dirty="0"/>
+              <a:t>specifically computational approximations. </a:t>
+            </a:r>
+          </a:p>
+        </p:txBody>
+      </p:sp>
+    </p:spTree>
+    <p:extLst>
+      <p:ext uri="{BB962C8B-B14F-4D97-AF65-F5344CB8AC3E}">
+        <p14:creationId xmlns:p14="http://schemas.microsoft.com/office/powerpoint/2010/main" val="682773001"/>
       </p:ext>
     </p:extLst>
   </p:cSld>

</xml_diff>